<commit_message>
Set latex files. On writing introduction & related Works
</commit_message>
<xml_diff>
--- a/presentation_materials/Drone_image.pptx
+++ b/presentation_materials/Drone_image.pptx
@@ -255,7 +255,7 @@
           <a:p>
             <a:fld id="{52069A89-FEE0-48EB-98A1-4EBF025DE6F6}" type="datetimeFigureOut">
               <a:rPr lang="ko-KR" altLang="en-US" smtClean="0"/>
-              <a:t>2018-08-29</a:t>
+              <a:t>2018-09-17</a:t>
             </a:fld>
             <a:endParaRPr lang="ko-KR" altLang="en-US"/>
           </a:p>
@@ -425,7 +425,7 @@
           <a:p>
             <a:fld id="{52069A89-FEE0-48EB-98A1-4EBF025DE6F6}" type="datetimeFigureOut">
               <a:rPr lang="ko-KR" altLang="en-US" smtClean="0"/>
-              <a:t>2018-08-29</a:t>
+              <a:t>2018-09-17</a:t>
             </a:fld>
             <a:endParaRPr lang="ko-KR" altLang="en-US"/>
           </a:p>
@@ -605,7 +605,7 @@
           <a:p>
             <a:fld id="{52069A89-FEE0-48EB-98A1-4EBF025DE6F6}" type="datetimeFigureOut">
               <a:rPr lang="ko-KR" altLang="en-US" smtClean="0"/>
-              <a:t>2018-08-29</a:t>
+              <a:t>2018-09-17</a:t>
             </a:fld>
             <a:endParaRPr lang="ko-KR" altLang="en-US"/>
           </a:p>
@@ -775,7 +775,7 @@
           <a:p>
             <a:fld id="{52069A89-FEE0-48EB-98A1-4EBF025DE6F6}" type="datetimeFigureOut">
               <a:rPr lang="ko-KR" altLang="en-US" smtClean="0"/>
-              <a:t>2018-08-29</a:t>
+              <a:t>2018-09-17</a:t>
             </a:fld>
             <a:endParaRPr lang="ko-KR" altLang="en-US"/>
           </a:p>
@@ -1021,7 +1021,7 @@
           <a:p>
             <a:fld id="{52069A89-FEE0-48EB-98A1-4EBF025DE6F6}" type="datetimeFigureOut">
               <a:rPr lang="ko-KR" altLang="en-US" smtClean="0"/>
-              <a:t>2018-08-29</a:t>
+              <a:t>2018-09-17</a:t>
             </a:fld>
             <a:endParaRPr lang="ko-KR" altLang="en-US"/>
           </a:p>
@@ -1253,7 +1253,7 @@
           <a:p>
             <a:fld id="{52069A89-FEE0-48EB-98A1-4EBF025DE6F6}" type="datetimeFigureOut">
               <a:rPr lang="ko-KR" altLang="en-US" smtClean="0"/>
-              <a:t>2018-08-29</a:t>
+              <a:t>2018-09-17</a:t>
             </a:fld>
             <a:endParaRPr lang="ko-KR" altLang="en-US"/>
           </a:p>
@@ -1620,7 +1620,7 @@
           <a:p>
             <a:fld id="{52069A89-FEE0-48EB-98A1-4EBF025DE6F6}" type="datetimeFigureOut">
               <a:rPr lang="ko-KR" altLang="en-US" smtClean="0"/>
-              <a:t>2018-08-29</a:t>
+              <a:t>2018-09-17</a:t>
             </a:fld>
             <a:endParaRPr lang="ko-KR" altLang="en-US"/>
           </a:p>
@@ -1738,7 +1738,7 @@
           <a:p>
             <a:fld id="{52069A89-FEE0-48EB-98A1-4EBF025DE6F6}" type="datetimeFigureOut">
               <a:rPr lang="ko-KR" altLang="en-US" smtClean="0"/>
-              <a:t>2018-08-29</a:t>
+              <a:t>2018-09-17</a:t>
             </a:fld>
             <a:endParaRPr lang="ko-KR" altLang="en-US"/>
           </a:p>
@@ -1833,7 +1833,7 @@
           <a:p>
             <a:fld id="{52069A89-FEE0-48EB-98A1-4EBF025DE6F6}" type="datetimeFigureOut">
               <a:rPr lang="ko-KR" altLang="en-US" smtClean="0"/>
-              <a:t>2018-08-29</a:t>
+              <a:t>2018-09-17</a:t>
             </a:fld>
             <a:endParaRPr lang="ko-KR" altLang="en-US"/>
           </a:p>
@@ -2110,7 +2110,7 @@
           <a:p>
             <a:fld id="{52069A89-FEE0-48EB-98A1-4EBF025DE6F6}" type="datetimeFigureOut">
               <a:rPr lang="ko-KR" altLang="en-US" smtClean="0"/>
-              <a:t>2018-08-29</a:t>
+              <a:t>2018-09-17</a:t>
             </a:fld>
             <a:endParaRPr lang="ko-KR" altLang="en-US"/>
           </a:p>
@@ -2363,7 +2363,7 @@
           <a:p>
             <a:fld id="{52069A89-FEE0-48EB-98A1-4EBF025DE6F6}" type="datetimeFigureOut">
               <a:rPr lang="ko-KR" altLang="en-US" smtClean="0"/>
-              <a:t>2018-08-29</a:t>
+              <a:t>2018-09-17</a:t>
             </a:fld>
             <a:endParaRPr lang="ko-KR" altLang="en-US"/>
           </a:p>
@@ -2576,7 +2576,7 @@
           <a:p>
             <a:fld id="{52069A89-FEE0-48EB-98A1-4EBF025DE6F6}" type="datetimeFigureOut">
               <a:rPr lang="ko-KR" altLang="en-US" smtClean="0"/>
-              <a:t>2018-08-29</a:t>
+              <a:t>2018-09-17</a:t>
             </a:fld>
             <a:endParaRPr lang="ko-KR" altLang="en-US"/>
           </a:p>
@@ -5258,8 +5258,8 @@
           </a:p>
         </p:txBody>
       </p:sp>
-      <mc:AlternateContent xmlns:mc="http://schemas.openxmlformats.org/markup-compatibility/2006">
-        <mc:Choice xmlns:a14="http://schemas.microsoft.com/office/drawing/2010/main" Requires="a14">
+      <mc:AlternateContent xmlns:mc="http://schemas.openxmlformats.org/markup-compatibility/2006" xmlns:a14="http://schemas.microsoft.com/office/drawing/2010/main">
+        <mc:Choice Requires="a14">
           <p:sp>
             <p:nvSpPr>
               <p:cNvPr id="22" name="타원 21"/>
@@ -5470,7 +5470,7 @@
             </p:txBody>
           </p:sp>
         </mc:Choice>
-        <mc:Fallback>
+        <mc:Fallback xmlns="">
           <p:sp>
             <p:nvSpPr>
               <p:cNvPr id="22" name="타원 21"/>

</xml_diff>